<commit_message>
Update what was Figure 4 (now 2)
</commit_message>
<xml_diff>
--- a/figures/Example Suplemental Diagram of Data Loss.pptx
+++ b/figures/Example Suplemental Diagram of Data Loss.pptx
@@ -13,6 +13,8 @@
     <p:sldId id="261" r:id="rId7"/>
     <p:sldId id="262" r:id="rId8"/>
     <p:sldId id="263" r:id="rId9"/>
+    <p:sldId id="264" r:id="rId10"/>
+    <p:sldId id="265" r:id="rId11"/>
   </p:sldIdLst>
   <p:sldSz cx="12192000" cy="6858000"/>
   <p:notesSz cx="6858000" cy="9144000"/>
@@ -266,7 +268,7 @@
           <a:p>
             <a:fld id="{7CE6D4B3-3277-43F5-9721-7AA08BF389B4}" type="datetimeFigureOut">
               <a:rPr lang="en-US" smtClean="0"/>
-              <a:t>4/12/2021</a:t>
+              <a:t>4/13/2021</a:t>
             </a:fld>
             <a:endParaRPr lang="en-US"/>
           </a:p>
@@ -464,7 +466,7 @@
           <a:p>
             <a:fld id="{7CE6D4B3-3277-43F5-9721-7AA08BF389B4}" type="datetimeFigureOut">
               <a:rPr lang="en-US" smtClean="0"/>
-              <a:t>4/12/2021</a:t>
+              <a:t>4/13/2021</a:t>
             </a:fld>
             <a:endParaRPr lang="en-US"/>
           </a:p>
@@ -672,7 +674,7 @@
           <a:p>
             <a:fld id="{7CE6D4B3-3277-43F5-9721-7AA08BF389B4}" type="datetimeFigureOut">
               <a:rPr lang="en-US" smtClean="0"/>
-              <a:t>4/12/2021</a:t>
+              <a:t>4/13/2021</a:t>
             </a:fld>
             <a:endParaRPr lang="en-US"/>
           </a:p>
@@ -870,7 +872,7 @@
           <a:p>
             <a:fld id="{7CE6D4B3-3277-43F5-9721-7AA08BF389B4}" type="datetimeFigureOut">
               <a:rPr lang="en-US" smtClean="0"/>
-              <a:t>4/12/2021</a:t>
+              <a:t>4/13/2021</a:t>
             </a:fld>
             <a:endParaRPr lang="en-US"/>
           </a:p>
@@ -1145,7 +1147,7 @@
           <a:p>
             <a:fld id="{7CE6D4B3-3277-43F5-9721-7AA08BF389B4}" type="datetimeFigureOut">
               <a:rPr lang="en-US" smtClean="0"/>
-              <a:t>4/12/2021</a:t>
+              <a:t>4/13/2021</a:t>
             </a:fld>
             <a:endParaRPr lang="en-US"/>
           </a:p>
@@ -1410,7 +1412,7 @@
           <a:p>
             <a:fld id="{7CE6D4B3-3277-43F5-9721-7AA08BF389B4}" type="datetimeFigureOut">
               <a:rPr lang="en-US" smtClean="0"/>
-              <a:t>4/12/2021</a:t>
+              <a:t>4/13/2021</a:t>
             </a:fld>
             <a:endParaRPr lang="en-US"/>
           </a:p>
@@ -1822,7 +1824,7 @@
           <a:p>
             <a:fld id="{7CE6D4B3-3277-43F5-9721-7AA08BF389B4}" type="datetimeFigureOut">
               <a:rPr lang="en-US" smtClean="0"/>
-              <a:t>4/12/2021</a:t>
+              <a:t>4/13/2021</a:t>
             </a:fld>
             <a:endParaRPr lang="en-US"/>
           </a:p>
@@ -1963,7 +1965,7 @@
           <a:p>
             <a:fld id="{7CE6D4B3-3277-43F5-9721-7AA08BF389B4}" type="datetimeFigureOut">
               <a:rPr lang="en-US" smtClean="0"/>
-              <a:t>4/12/2021</a:t>
+              <a:t>4/13/2021</a:t>
             </a:fld>
             <a:endParaRPr lang="en-US"/>
           </a:p>
@@ -2076,7 +2078,7 @@
           <a:p>
             <a:fld id="{7CE6D4B3-3277-43F5-9721-7AA08BF389B4}" type="datetimeFigureOut">
               <a:rPr lang="en-US" smtClean="0"/>
-              <a:t>4/12/2021</a:t>
+              <a:t>4/13/2021</a:t>
             </a:fld>
             <a:endParaRPr lang="en-US"/>
           </a:p>
@@ -2387,7 +2389,7 @@
           <a:p>
             <a:fld id="{7CE6D4B3-3277-43F5-9721-7AA08BF389B4}" type="datetimeFigureOut">
               <a:rPr lang="en-US" smtClean="0"/>
-              <a:t>4/12/2021</a:t>
+              <a:t>4/13/2021</a:t>
             </a:fld>
             <a:endParaRPr lang="en-US"/>
           </a:p>
@@ -2675,7 +2677,7 @@
           <a:p>
             <a:fld id="{7CE6D4B3-3277-43F5-9721-7AA08BF389B4}" type="datetimeFigureOut">
               <a:rPr lang="en-US" smtClean="0"/>
-              <a:t>4/12/2021</a:t>
+              <a:t>4/13/2021</a:t>
             </a:fld>
             <a:endParaRPr lang="en-US"/>
           </a:p>
@@ -2916,7 +2918,7 @@
           <a:p>
             <a:fld id="{7CE6D4B3-3277-43F5-9721-7AA08BF389B4}" type="datetimeFigureOut">
               <a:rPr lang="en-US" smtClean="0"/>
-              <a:t>4/12/2021</a:t>
+              <a:t>4/13/2021</a:t>
             </a:fld>
             <a:endParaRPr lang="en-US"/>
           </a:p>
@@ -3649,6 +3651,66 @@
 </p:sld>
 </file>
 
+<file path=ppt/slides/slide10.xml><?xml version="1.0" encoding="utf-8"?>
+<p:sld xmlns:a="http://schemas.openxmlformats.org/drawingml/2006/main" xmlns:r="http://schemas.openxmlformats.org/officeDocument/2006/relationships" xmlns:p="http://schemas.openxmlformats.org/presentationml/2006/main">
+  <p:cSld>
+    <p:spTree>
+      <p:nvGrpSpPr>
+        <p:cNvPr id="1" name=""/>
+        <p:cNvGrpSpPr/>
+        <p:nvPr/>
+      </p:nvGrpSpPr>
+      <p:grpSpPr>
+        <a:xfrm>
+          <a:off x="0" y="0"/>
+          <a:ext cx="0" cy="0"/>
+          <a:chOff x="0" y="0"/>
+          <a:chExt cx="0" cy="0"/>
+        </a:xfrm>
+      </p:grpSpPr>
+      <p:pic>
+        <p:nvPicPr>
+          <p:cNvPr id="15" name="Picture 14">
+            <a:extLst>
+              <a:ext uri="{FF2B5EF4-FFF2-40B4-BE49-F238E27FC236}">
+                <a16:creationId xmlns:a16="http://schemas.microsoft.com/office/drawing/2014/main" id="{62E6BB47-B015-430A-ABE4-3F9309E8A04D}"/>
+              </a:ext>
+            </a:extLst>
+          </p:cNvPr>
+          <p:cNvPicPr>
+            <a:picLocks noChangeAspect="1"/>
+          </p:cNvPicPr>
+          <p:nvPr/>
+        </p:nvPicPr>
+        <p:blipFill>
+          <a:blip r:embed="rId2"/>
+          <a:stretch>
+            <a:fillRect/>
+          </a:stretch>
+        </p:blipFill>
+        <p:spPr>
+          <a:xfrm>
+            <a:off x="2453324" y="1532979"/>
+            <a:ext cx="7285351" cy="3792041"/>
+          </a:xfrm>
+          <a:prstGeom prst="rect">
+            <a:avLst/>
+          </a:prstGeom>
+        </p:spPr>
+      </p:pic>
+    </p:spTree>
+    <p:extLst>
+      <p:ext uri="{BB962C8B-B14F-4D97-AF65-F5344CB8AC3E}">
+        <p14:creationId xmlns:p14="http://schemas.microsoft.com/office/powerpoint/2010/main" val="4185193568"/>
+      </p:ext>
+    </p:extLst>
+  </p:cSld>
+  <p:clrMapOvr>
+    <a:masterClrMapping/>
+  </p:clrMapOvr>
+</p:sld>
+</file>
+
 <file path=ppt/slides/slide2.xml><?xml version="1.0" encoding="utf-8"?>
 <p:sld xmlns:a="http://schemas.openxmlformats.org/drawingml/2006/main" xmlns:r="http://schemas.openxmlformats.org/officeDocument/2006/relationships" xmlns:p="http://schemas.openxmlformats.org/presentationml/2006/main">
   <p:cSld>
@@ -4633,7 +4695,7 @@
         </p:nvSpPr>
         <p:spPr>
           <a:xfrm>
-            <a:off x="5972556" y="3305556"/>
+            <a:off x="7731070" y="5008553"/>
             <a:ext cx="246888" cy="246888"/>
           </a:xfrm>
           <a:prstGeom prst="ellipse">
@@ -4677,7 +4739,7 @@
         </p:nvSpPr>
         <p:spPr>
           <a:xfrm>
-            <a:off x="4193457" y="2237601"/>
+            <a:off x="4229572" y="5301829"/>
             <a:ext cx="3805084" cy="646331"/>
           </a:xfrm>
           <a:prstGeom prst="rect">
@@ -4720,7 +4782,7 @@
         </p:nvSpPr>
         <p:spPr>
           <a:xfrm>
-            <a:off x="4399986" y="3518875"/>
+            <a:off x="6158501" y="5304188"/>
             <a:ext cx="3392026" cy="646331"/>
           </a:xfrm>
           <a:prstGeom prst="rect">
@@ -5266,6 +5328,210 @@
     <p:extLst>
       <p:ext uri="{BB962C8B-B14F-4D97-AF65-F5344CB8AC3E}">
         <p14:creationId xmlns:p14="http://schemas.microsoft.com/office/powerpoint/2010/main" val="1842327230"/>
+      </p:ext>
+    </p:extLst>
+  </p:cSld>
+  <p:clrMapOvr>
+    <a:masterClrMapping/>
+  </p:clrMapOvr>
+</p:sld>
+</file>
+
+<file path=ppt/slides/slide9.xml><?xml version="1.0" encoding="utf-8"?>
+<p:sld xmlns:a="http://schemas.openxmlformats.org/drawingml/2006/main" xmlns:r="http://schemas.openxmlformats.org/officeDocument/2006/relationships" xmlns:p="http://schemas.openxmlformats.org/presentationml/2006/main">
+  <p:cSld>
+    <p:spTree>
+      <p:nvGrpSpPr>
+        <p:cNvPr id="1" name=""/>
+        <p:cNvGrpSpPr/>
+        <p:nvPr/>
+      </p:nvGrpSpPr>
+      <p:grpSpPr>
+        <a:xfrm>
+          <a:off x="0" y="0"/>
+          <a:ext cx="0" cy="0"/>
+          <a:chOff x="0" y="0"/>
+          <a:chExt cx="0" cy="0"/>
+        </a:xfrm>
+      </p:grpSpPr>
+      <p:sp>
+        <p:nvSpPr>
+          <p:cNvPr id="10" name="Oval 9">
+            <a:extLst>
+              <a:ext uri="{FF2B5EF4-FFF2-40B4-BE49-F238E27FC236}">
+                <a16:creationId xmlns:a16="http://schemas.microsoft.com/office/drawing/2014/main" id="{0CF6A6DD-6FDE-4138-B5BF-512B625FD528}"/>
+              </a:ext>
+            </a:extLst>
+          </p:cNvPr>
+          <p:cNvSpPr/>
+          <p:nvPr/>
+        </p:nvSpPr>
+        <p:spPr>
+          <a:xfrm>
+            <a:off x="2932922" y="1684176"/>
+            <a:ext cx="3657600" cy="3657600"/>
+          </a:xfrm>
+          <a:prstGeom prst="ellipse">
+            <a:avLst/>
+          </a:prstGeom>
+        </p:spPr>
+        <p:style>
+          <a:lnRef idx="0">
+            <a:schemeClr val="accent2"/>
+          </a:lnRef>
+          <a:fillRef idx="3">
+            <a:schemeClr val="accent2"/>
+          </a:fillRef>
+          <a:effectRef idx="3">
+            <a:schemeClr val="accent2"/>
+          </a:effectRef>
+          <a:fontRef idx="minor">
+            <a:schemeClr val="lt1"/>
+          </a:fontRef>
+        </p:style>
+        <p:txBody>
+          <a:bodyPr rtlCol="0" anchor="ctr"/>
+          <a:lstStyle/>
+          <a:p>
+            <a:pPr algn="ctr"/>
+            <a:endParaRPr lang="en-US" dirty="0"/>
+          </a:p>
+        </p:txBody>
+      </p:sp>
+      <p:sp>
+        <p:nvSpPr>
+          <p:cNvPr id="11" name="Oval 10">
+            <a:extLst>
+              <a:ext uri="{FF2B5EF4-FFF2-40B4-BE49-F238E27FC236}">
+                <a16:creationId xmlns:a16="http://schemas.microsoft.com/office/drawing/2014/main" id="{1DCCCBE0-3E89-4425-9ECE-0F00CA1526FA}"/>
+              </a:ext>
+            </a:extLst>
+          </p:cNvPr>
+          <p:cNvSpPr/>
+          <p:nvPr/>
+        </p:nvSpPr>
+        <p:spPr>
+          <a:xfrm>
+            <a:off x="6498475" y="4895167"/>
+            <a:ext cx="246888" cy="246888"/>
+          </a:xfrm>
+          <a:prstGeom prst="ellipse">
+            <a:avLst/>
+          </a:prstGeom>
+        </p:spPr>
+        <p:style>
+          <a:lnRef idx="0">
+            <a:schemeClr val="accent6"/>
+          </a:lnRef>
+          <a:fillRef idx="3">
+            <a:schemeClr val="accent6"/>
+          </a:fillRef>
+          <a:effectRef idx="3">
+            <a:schemeClr val="accent6"/>
+          </a:effectRef>
+          <a:fontRef idx="minor">
+            <a:schemeClr val="lt1"/>
+          </a:fontRef>
+        </p:style>
+        <p:txBody>
+          <a:bodyPr rtlCol="0" anchor="ctr"/>
+          <a:lstStyle/>
+          <a:p>
+            <a:pPr algn="ctr"/>
+            <a:endParaRPr lang="en-US"/>
+          </a:p>
+        </p:txBody>
+      </p:sp>
+      <p:sp>
+        <p:nvSpPr>
+          <p:cNvPr id="12" name="TextBox 11">
+            <a:extLst>
+              <a:ext uri="{FF2B5EF4-FFF2-40B4-BE49-F238E27FC236}">
+                <a16:creationId xmlns:a16="http://schemas.microsoft.com/office/drawing/2014/main" id="{34FDC1D1-6AE1-4643-B038-899666861D84}"/>
+              </a:ext>
+            </a:extLst>
+          </p:cNvPr>
+          <p:cNvSpPr txBox="1"/>
+          <p:nvPr/>
+        </p:nvSpPr>
+        <p:spPr>
+          <a:xfrm>
+            <a:off x="6350289" y="3105834"/>
+            <a:ext cx="3805084" cy="646331"/>
+          </a:xfrm>
+          <a:prstGeom prst="rect">
+            <a:avLst/>
+          </a:prstGeom>
+          <a:noFill/>
+        </p:spPr>
+        <p:txBody>
+          <a:bodyPr wrap="square">
+            <a:spAutoFit/>
+          </a:bodyPr>
+          <a:lstStyle/>
+          <a:p>
+            <a:pPr algn="ctr"/>
+            <a:r>
+              <a:rPr lang="en-US" b="1" dirty="0"/>
+              <a:t>Initial Composite Data</a:t>
+            </a:r>
+          </a:p>
+          <a:p>
+            <a:pPr algn="ctr"/>
+            <a:r>
+              <a:rPr lang="en-US" b="1" dirty="0"/>
+              <a:t>11289 Observations, 30 Factors</a:t>
+            </a:r>
+          </a:p>
+        </p:txBody>
+      </p:sp>
+      <p:sp>
+        <p:nvSpPr>
+          <p:cNvPr id="13" name="TextBox 12">
+            <a:extLst>
+              <a:ext uri="{FF2B5EF4-FFF2-40B4-BE49-F238E27FC236}">
+                <a16:creationId xmlns:a16="http://schemas.microsoft.com/office/drawing/2014/main" id="{8B94AA4C-7614-4ECF-A069-4EF40FDA1097}"/>
+              </a:ext>
+            </a:extLst>
+          </p:cNvPr>
+          <p:cNvSpPr txBox="1"/>
+          <p:nvPr/>
+        </p:nvSpPr>
+        <p:spPr>
+          <a:xfrm>
+            <a:off x="6711673" y="4695445"/>
+            <a:ext cx="3266720" cy="646331"/>
+          </a:xfrm>
+          <a:prstGeom prst="rect">
+            <a:avLst/>
+          </a:prstGeom>
+          <a:noFill/>
+        </p:spPr>
+        <p:txBody>
+          <a:bodyPr wrap="square">
+            <a:spAutoFit/>
+          </a:bodyPr>
+          <a:lstStyle/>
+          <a:p>
+            <a:pPr algn="ctr"/>
+            <a:r>
+              <a:rPr lang="en-US" b="1" dirty="0"/>
+              <a:t>Data Without Missing Values</a:t>
+            </a:r>
+          </a:p>
+          <a:p>
+            <a:pPr algn="ctr"/>
+            <a:r>
+              <a:rPr lang="en-US" b="1" dirty="0"/>
+              <a:t>1021 Observations, 6 Factors</a:t>
+            </a:r>
+          </a:p>
+        </p:txBody>
+      </p:sp>
+    </p:spTree>
+    <p:extLst>
+      <p:ext uri="{BB962C8B-B14F-4D97-AF65-F5344CB8AC3E}">
+        <p14:creationId xmlns:p14="http://schemas.microsoft.com/office/powerpoint/2010/main" val="3085272324"/>
       </p:ext>
     </p:extLst>
   </p:cSld>

</xml_diff>